<commit_message>
Introduced "invitation chain concept"
</commit_message>
<xml_diff>
--- a/com.supeyou.project/doc/SupeYou.datamodel.pptx
+++ b/com.supeyou.project/doc/SupeYou.datamodel.pptx
@@ -9,7 +9,8 @@
     <p:sldId id="306" r:id="rId3"/>
     <p:sldId id="366" r:id="rId4"/>
     <p:sldId id="367" r:id="rId5"/>
-    <p:sldId id="364" r:id="rId6"/>
+    <p:sldId id="368" r:id="rId6"/>
+    <p:sldId id="364" r:id="rId7"/>
   </p:sldIdLst>
   <p:sldSz cx="9144000" cy="6858000" type="screen4x3"/>
   <p:notesSz cx="6858000" cy="9144000"/>
@@ -332,7 +333,7 @@
               <a:pPr>
                 <a:defRPr/>
               </a:pPr>
-              <a:t>12.08.2015</a:t>
+              <a:t>12.04.2016</a:t>
             </a:fld>
             <a:endParaRPr lang="de-CH"/>
           </a:p>
@@ -529,7 +530,7 @@
               <a:pPr>
                 <a:defRPr/>
               </a:pPr>
-              <a:t>12.08.2015</a:t>
+              <a:t>12.04.2016</a:t>
             </a:fld>
             <a:endParaRPr lang="de-CH"/>
           </a:p>
@@ -736,7 +737,7 @@
               <a:pPr>
                 <a:defRPr/>
               </a:pPr>
-              <a:t>12.08.2015</a:t>
+              <a:t>12.04.2016</a:t>
             </a:fld>
             <a:endParaRPr lang="de-CH"/>
           </a:p>
@@ -933,7 +934,7 @@
               <a:pPr>
                 <a:defRPr/>
               </a:pPr>
-              <a:t>12.08.2015</a:t>
+              <a:t>12.04.2016</a:t>
             </a:fld>
             <a:endParaRPr lang="de-CH"/>
           </a:p>
@@ -1206,7 +1207,7 @@
               <a:pPr>
                 <a:defRPr/>
               </a:pPr>
-              <a:t>12.08.2015</a:t>
+              <a:t>12.04.2016</a:t>
             </a:fld>
             <a:endParaRPr lang="de-CH"/>
           </a:p>
@@ -1521,7 +1522,7 @@
               <a:pPr>
                 <a:defRPr/>
               </a:pPr>
-              <a:t>12.08.2015</a:t>
+              <a:t>12.04.2016</a:t>
             </a:fld>
             <a:endParaRPr lang="de-CH"/>
           </a:p>
@@ -1970,7 +1971,7 @@
               <a:pPr>
                 <a:defRPr/>
               </a:pPr>
-              <a:t>12.08.2015</a:t>
+              <a:t>12.04.2016</a:t>
             </a:fld>
             <a:endParaRPr lang="de-CH"/>
           </a:p>
@@ -2115,7 +2116,7 @@
               <a:pPr>
                 <a:defRPr/>
               </a:pPr>
-              <a:t>12.08.2015</a:t>
+              <a:t>12.04.2016</a:t>
             </a:fld>
             <a:endParaRPr lang="de-CH"/>
           </a:p>
@@ -2237,7 +2238,7 @@
               <a:pPr>
                 <a:defRPr/>
               </a:pPr>
-              <a:t>12.08.2015</a:t>
+              <a:t>12.04.2016</a:t>
             </a:fld>
             <a:endParaRPr lang="de-CH"/>
           </a:p>
@@ -2541,7 +2542,7 @@
               <a:pPr>
                 <a:defRPr/>
               </a:pPr>
-              <a:t>12.08.2015</a:t>
+              <a:t>12.04.2016</a:t>
             </a:fld>
             <a:endParaRPr lang="de-CH"/>
           </a:p>
@@ -2824,7 +2825,7 @@
               <a:pPr>
                 <a:defRPr/>
               </a:pPr>
-              <a:t>12.08.2015</a:t>
+              <a:t>12.04.2016</a:t>
             </a:fld>
             <a:endParaRPr lang="de-CH"/>
           </a:p>
@@ -3122,7 +3123,7 @@
               <a:pPr>
                 <a:defRPr/>
               </a:pPr>
-              <a:t>12.08.2015</a:t>
+              <a:t>12.04.2016</a:t>
             </a:fld>
             <a:endParaRPr lang="de-CH"/>
           </a:p>
@@ -18996,6 +18997,1386 @@
           <a:chExt cx="0" cy="0"/>
         </a:xfrm>
       </p:grpSpPr>
+      <p:cxnSp>
+        <p:nvCxnSpPr>
+          <p:cNvPr id="35" name="Gekrümmte Verbindung 34"/>
+          <p:cNvCxnSpPr>
+            <a:stCxn id="113" idx="2"/>
+            <a:endCxn id="141" idx="0"/>
+          </p:cNvCxnSpPr>
+          <p:nvPr/>
+        </p:nvCxnSpPr>
+        <p:spPr>
+          <a:xfrm rot="5400000">
+            <a:off x="5584585" y="2408117"/>
+            <a:ext cx="294595" cy="18978"/>
+          </a:xfrm>
+          <a:prstGeom prst="curvedConnector3">
+            <a:avLst>
+              <a:gd name="adj1" fmla="val 50000"/>
+            </a:avLst>
+          </a:prstGeom>
+        </p:spPr>
+        <p:style>
+          <a:lnRef idx="1">
+            <a:schemeClr val="accent1"/>
+          </a:lnRef>
+          <a:fillRef idx="0">
+            <a:schemeClr val="accent1"/>
+          </a:fillRef>
+          <a:effectRef idx="0">
+            <a:schemeClr val="accent1"/>
+          </a:effectRef>
+          <a:fontRef idx="minor">
+            <a:schemeClr val="tx1"/>
+          </a:fontRef>
+        </p:style>
+      </p:cxnSp>
+      <p:cxnSp>
+        <p:nvCxnSpPr>
+          <p:cNvPr id="69" name="Gekrümmte Verbindung 68"/>
+          <p:cNvCxnSpPr>
+            <a:stCxn id="29" idx="2"/>
+            <a:endCxn id="91" idx="0"/>
+          </p:cNvCxnSpPr>
+          <p:nvPr/>
+        </p:nvCxnSpPr>
+        <p:spPr>
+          <a:xfrm rot="5400000">
+            <a:off x="5653463" y="1359563"/>
+            <a:ext cx="216171" cy="4748"/>
+          </a:xfrm>
+          <a:prstGeom prst="curvedConnector3">
+            <a:avLst>
+              <a:gd name="adj1" fmla="val 50000"/>
+            </a:avLst>
+          </a:prstGeom>
+        </p:spPr>
+        <p:style>
+          <a:lnRef idx="1">
+            <a:schemeClr val="accent1"/>
+          </a:lnRef>
+          <a:fillRef idx="0">
+            <a:schemeClr val="accent1"/>
+          </a:fillRef>
+          <a:effectRef idx="0">
+            <a:schemeClr val="accent1"/>
+          </a:effectRef>
+          <a:fontRef idx="minor">
+            <a:schemeClr val="tx1"/>
+          </a:fontRef>
+        </p:style>
+      </p:cxnSp>
+      <p:cxnSp>
+        <p:nvCxnSpPr>
+          <p:cNvPr id="152" name="Gekrümmte Verbindung 151"/>
+          <p:cNvCxnSpPr>
+            <a:stCxn id="153" idx="2"/>
+            <a:endCxn id="107" idx="0"/>
+          </p:cNvCxnSpPr>
+          <p:nvPr/>
+        </p:nvCxnSpPr>
+        <p:spPr>
+          <a:xfrm rot="5400000">
+            <a:off x="5363936" y="3648699"/>
+            <a:ext cx="678973" cy="12700"/>
+          </a:xfrm>
+          <a:prstGeom prst="curvedConnector3">
+            <a:avLst>
+              <a:gd name="adj1" fmla="val 50000"/>
+            </a:avLst>
+          </a:prstGeom>
+        </p:spPr>
+        <p:style>
+          <a:lnRef idx="1">
+            <a:schemeClr val="accent1"/>
+          </a:lnRef>
+          <a:fillRef idx="0">
+            <a:schemeClr val="accent1"/>
+          </a:fillRef>
+          <a:effectRef idx="0">
+            <a:schemeClr val="accent1"/>
+          </a:effectRef>
+          <a:fontRef idx="minor">
+            <a:schemeClr val="tx1"/>
+          </a:fontRef>
+        </p:style>
+      </p:cxnSp>
+      <p:grpSp>
+        <p:nvGrpSpPr>
+          <p:cNvPr id="17" name="Gruppieren 16"/>
+          <p:cNvGrpSpPr/>
+          <p:nvPr/>
+        </p:nvGrpSpPr>
+        <p:grpSpPr>
+          <a:xfrm>
+            <a:off x="5436096" y="2564904"/>
+            <a:ext cx="572593" cy="592753"/>
+            <a:chOff x="4756769" y="3139040"/>
+            <a:chExt cx="572593" cy="592753"/>
+          </a:xfrm>
+        </p:grpSpPr>
+        <p:grpSp>
+          <p:nvGrpSpPr>
+            <p:cNvPr id="32" name="Gruppieren 31"/>
+            <p:cNvGrpSpPr/>
+            <p:nvPr/>
+          </p:nvGrpSpPr>
+          <p:grpSpPr>
+            <a:xfrm>
+              <a:off x="4756769" y="3305899"/>
+              <a:ext cx="572593" cy="425894"/>
+              <a:chOff x="2503939" y="1440636"/>
+              <a:chExt cx="572593" cy="425894"/>
+            </a:xfrm>
+          </p:grpSpPr>
+          <p:sp>
+            <p:nvSpPr>
+              <p:cNvPr id="33" name="Textfeld 32"/>
+              <p:cNvSpPr txBox="1"/>
+              <p:nvPr/>
+            </p:nvSpPr>
+            <p:spPr>
+              <a:xfrm>
+                <a:off x="2503939" y="1620309"/>
+                <a:ext cx="572593" cy="246221"/>
+              </a:xfrm>
+              <a:prstGeom prst="rect">
+                <a:avLst/>
+              </a:prstGeom>
+              <a:noFill/>
+            </p:spPr>
+            <p:txBody>
+              <a:bodyPr wrap="none" rtlCol="0">
+                <a:spAutoFit/>
+              </a:bodyPr>
+              <a:lstStyle/>
+              <a:p>
+                <a:r>
+                  <a:rPr lang="de-DE" sz="1000" dirty="0" smtClean="0"/>
+                  <a:t>Gunnar</a:t>
+                </a:r>
+                <a:endParaRPr lang="en-US" sz="1000" dirty="0"/>
+              </a:p>
+            </p:txBody>
+          </p:sp>
+          <p:pic>
+            <p:nvPicPr>
+              <p:cNvPr id="34" name="Picture 3" descr="C:\Users\MoritzTheile\eclipse_SupeYou\com.supeyou.app\src\main\webapp\heroPics\skype_smile.png"/>
+              <p:cNvPicPr>
+                <a:picLocks noChangeAspect="1" noChangeArrowheads="1"/>
+              </p:cNvPicPr>
+              <p:nvPr/>
+            </p:nvPicPr>
+            <p:blipFill>
+              <a:blip r:embed="rId2">
+                <a:extLst>
+                  <a:ext uri="{28A0092B-C50C-407E-A947-70E740481C1C}">
+                    <a14:useLocalDpi xmlns:a14="http://schemas.microsoft.com/office/drawing/2010/main" val="0"/>
+                  </a:ext>
+                </a:extLst>
+              </a:blip>
+              <a:srcRect/>
+              <a:stretch>
+                <a:fillRect/>
+              </a:stretch>
+            </p:blipFill>
+            <p:spPr bwMode="auto">
+              <a:xfrm>
+                <a:off x="2653308" y="1440636"/>
+                <a:ext cx="190500" cy="190500"/>
+              </a:xfrm>
+              <a:prstGeom prst="rect">
+                <a:avLst/>
+              </a:prstGeom>
+              <a:noFill/>
+              <a:extLst>
+                <a:ext uri="{909E8E84-426E-40DD-AFC4-6F175D3DCCD1}">
+                  <a14:hiddenFill xmlns:a14="http://schemas.microsoft.com/office/drawing/2010/main">
+                    <a:solidFill>
+                      <a:srgbClr val="FFFFFF"/>
+                    </a:solidFill>
+                  </a14:hiddenFill>
+                </a:ext>
+              </a:extLst>
+            </p:spPr>
+          </p:pic>
+        </p:grpSp>
+        <p:sp>
+          <p:nvSpPr>
+            <p:cNvPr id="141" name="Textfeld 140"/>
+            <p:cNvSpPr txBox="1"/>
+            <p:nvPr/>
+          </p:nvSpPr>
+          <p:spPr>
+            <a:xfrm>
+              <a:off x="4880201" y="3139040"/>
+              <a:ext cx="325730" cy="160310"/>
+            </a:xfrm>
+            <a:prstGeom prst="rect">
+              <a:avLst/>
+            </a:prstGeom>
+            <a:noFill/>
+          </p:spPr>
+          <p:txBody>
+            <a:bodyPr wrap="none" tIns="18000" bIns="3600" rtlCol="0">
+              <a:spAutoFit/>
+            </a:bodyPr>
+            <a:lstStyle/>
+            <a:p>
+              <a:r>
+                <a:rPr lang="de-DE" sz="900" dirty="0" smtClean="0"/>
+                <a:t>1 €</a:t>
+              </a:r>
+              <a:endParaRPr lang="en-US" sz="900" dirty="0"/>
+            </a:p>
+          </p:txBody>
+        </p:sp>
+      </p:grpSp>
+      <p:grpSp>
+        <p:nvGrpSpPr>
+          <p:cNvPr id="89" name="Gruppieren 88"/>
+          <p:cNvGrpSpPr/>
+          <p:nvPr/>
+        </p:nvGrpSpPr>
+        <p:grpSpPr>
+          <a:xfrm>
+            <a:off x="5508116" y="1470023"/>
+            <a:ext cx="423514" cy="592753"/>
+            <a:chOff x="4756769" y="3139040"/>
+            <a:chExt cx="423514" cy="592753"/>
+          </a:xfrm>
+        </p:grpSpPr>
+        <p:grpSp>
+          <p:nvGrpSpPr>
+            <p:cNvPr id="90" name="Gruppieren 89"/>
+            <p:cNvGrpSpPr/>
+            <p:nvPr/>
+          </p:nvGrpSpPr>
+          <p:grpSpPr>
+            <a:xfrm>
+              <a:off x="4756769" y="3305899"/>
+              <a:ext cx="423514" cy="425894"/>
+              <a:chOff x="2503939" y="1440636"/>
+              <a:chExt cx="423514" cy="425894"/>
+            </a:xfrm>
+          </p:grpSpPr>
+          <p:sp>
+            <p:nvSpPr>
+              <p:cNvPr id="92" name="Textfeld 91"/>
+              <p:cNvSpPr txBox="1"/>
+              <p:nvPr/>
+            </p:nvSpPr>
+            <p:spPr>
+              <a:xfrm>
+                <a:off x="2503939" y="1620309"/>
+                <a:ext cx="423514" cy="246221"/>
+              </a:xfrm>
+              <a:prstGeom prst="rect">
+                <a:avLst/>
+              </a:prstGeom>
+              <a:noFill/>
+            </p:spPr>
+            <p:txBody>
+              <a:bodyPr wrap="none" rtlCol="0">
+                <a:spAutoFit/>
+              </a:bodyPr>
+              <a:lstStyle/>
+              <a:p>
+                <a:r>
+                  <a:rPr lang="de-DE" sz="1000" dirty="0" smtClean="0"/>
+                  <a:t>Otto</a:t>
+                </a:r>
+                <a:endParaRPr lang="en-US" sz="1000" dirty="0"/>
+              </a:p>
+            </p:txBody>
+          </p:sp>
+          <p:pic>
+            <p:nvPicPr>
+              <p:cNvPr id="97" name="Picture 3" descr="C:\Users\MoritzTheile\eclipse_SupeYou\com.supeyou.app\src\main\webapp\heroPics\skype_smile.png"/>
+              <p:cNvPicPr>
+                <a:picLocks noChangeAspect="1" noChangeArrowheads="1"/>
+              </p:cNvPicPr>
+              <p:nvPr/>
+            </p:nvPicPr>
+            <p:blipFill>
+              <a:blip r:embed="rId2">
+                <a:extLst>
+                  <a:ext uri="{28A0092B-C50C-407E-A947-70E740481C1C}">
+                    <a14:useLocalDpi xmlns:a14="http://schemas.microsoft.com/office/drawing/2010/main" val="0"/>
+                  </a:ext>
+                </a:extLst>
+              </a:blip>
+              <a:srcRect/>
+              <a:stretch>
+                <a:fillRect/>
+              </a:stretch>
+            </p:blipFill>
+            <p:spPr bwMode="auto">
+              <a:xfrm>
+                <a:off x="2653308" y="1440636"/>
+                <a:ext cx="190500" cy="190500"/>
+              </a:xfrm>
+              <a:prstGeom prst="rect">
+                <a:avLst/>
+              </a:prstGeom>
+              <a:noFill/>
+              <a:extLst>
+                <a:ext uri="{909E8E84-426E-40DD-AFC4-6F175D3DCCD1}">
+                  <a14:hiddenFill xmlns:a14="http://schemas.microsoft.com/office/drawing/2010/main">
+                    <a:solidFill>
+                      <a:srgbClr val="FFFFFF"/>
+                    </a:solidFill>
+                  </a14:hiddenFill>
+                </a:ext>
+              </a:extLst>
+            </p:spPr>
+          </p:pic>
+        </p:grpSp>
+        <p:sp>
+          <p:nvSpPr>
+            <p:cNvPr id="91" name="Textfeld 90"/>
+            <p:cNvSpPr txBox="1"/>
+            <p:nvPr/>
+          </p:nvSpPr>
+          <p:spPr>
+            <a:xfrm>
+              <a:off x="4844962" y="3139040"/>
+              <a:ext cx="325730" cy="160310"/>
+            </a:xfrm>
+            <a:prstGeom prst="rect">
+              <a:avLst/>
+            </a:prstGeom>
+            <a:noFill/>
+          </p:spPr>
+          <p:txBody>
+            <a:bodyPr wrap="none" tIns="18000" bIns="3600" rtlCol="0">
+              <a:spAutoFit/>
+            </a:bodyPr>
+            <a:lstStyle/>
+            <a:p>
+              <a:r>
+                <a:rPr lang="de-DE" sz="900" dirty="0" smtClean="0"/>
+                <a:t>5 €</a:t>
+              </a:r>
+              <a:endParaRPr lang="en-US" sz="900" dirty="0"/>
+            </a:p>
+          </p:txBody>
+        </p:sp>
+      </p:grpSp>
+      <p:grpSp>
+        <p:nvGrpSpPr>
+          <p:cNvPr id="98" name="Gruppieren 97"/>
+          <p:cNvGrpSpPr/>
+          <p:nvPr/>
+        </p:nvGrpSpPr>
+        <p:grpSpPr>
+          <a:xfrm>
+            <a:off x="5533731" y="453566"/>
+            <a:ext cx="460382" cy="592753"/>
+            <a:chOff x="4756769" y="3139040"/>
+            <a:chExt cx="460382" cy="592753"/>
+          </a:xfrm>
+        </p:grpSpPr>
+        <p:sp>
+          <p:nvSpPr>
+            <p:cNvPr id="101" name="Textfeld 100"/>
+            <p:cNvSpPr txBox="1"/>
+            <p:nvPr/>
+          </p:nvSpPr>
+          <p:spPr>
+            <a:xfrm>
+              <a:off x="4756769" y="3485572"/>
+              <a:ext cx="460382" cy="246221"/>
+            </a:xfrm>
+            <a:prstGeom prst="rect">
+              <a:avLst/>
+            </a:prstGeom>
+            <a:noFill/>
+          </p:spPr>
+          <p:txBody>
+            <a:bodyPr wrap="none" rtlCol="0">
+              <a:spAutoFit/>
+            </a:bodyPr>
+            <a:lstStyle/>
+            <a:p>
+              <a:r>
+                <a:rPr lang="de-DE" sz="1000" dirty="0" smtClean="0"/>
+                <a:t>Hugo</a:t>
+              </a:r>
+              <a:endParaRPr lang="en-US" sz="1000" dirty="0"/>
+            </a:p>
+          </p:txBody>
+        </p:sp>
+        <p:sp>
+          <p:nvSpPr>
+            <p:cNvPr id="100" name="Textfeld 99"/>
+            <p:cNvSpPr txBox="1"/>
+            <p:nvPr/>
+          </p:nvSpPr>
+          <p:spPr>
+            <a:xfrm>
+              <a:off x="4795241" y="3139040"/>
+              <a:ext cx="383438" cy="160310"/>
+            </a:xfrm>
+            <a:prstGeom prst="rect">
+              <a:avLst/>
+            </a:prstGeom>
+            <a:noFill/>
+          </p:spPr>
+          <p:txBody>
+            <a:bodyPr wrap="none" tIns="18000" bIns="3600" rtlCol="0">
+              <a:spAutoFit/>
+            </a:bodyPr>
+            <a:lstStyle/>
+            <a:p>
+              <a:r>
+                <a:rPr lang="de-DE" sz="900" dirty="0" smtClean="0"/>
+                <a:t>13</a:t>
+              </a:r>
+              <a:r>
+                <a:rPr lang="de-DE" sz="900" dirty="0" smtClean="0"/>
+                <a:t> €</a:t>
+              </a:r>
+              <a:endParaRPr lang="en-US" sz="900" dirty="0"/>
+            </a:p>
+          </p:txBody>
+        </p:sp>
+      </p:grpSp>
+      <p:grpSp>
+        <p:nvGrpSpPr>
+          <p:cNvPr id="104" name="Gruppieren 103"/>
+          <p:cNvGrpSpPr/>
+          <p:nvPr/>
+        </p:nvGrpSpPr>
+        <p:grpSpPr>
+          <a:xfrm>
+            <a:off x="5417125" y="3988186"/>
+            <a:ext cx="595035" cy="592753"/>
+            <a:chOff x="4756769" y="3139040"/>
+            <a:chExt cx="595035" cy="592753"/>
+          </a:xfrm>
+        </p:grpSpPr>
+        <p:grpSp>
+          <p:nvGrpSpPr>
+            <p:cNvPr id="105" name="Gruppieren 104"/>
+            <p:cNvGrpSpPr/>
+            <p:nvPr/>
+          </p:nvGrpSpPr>
+          <p:grpSpPr>
+            <a:xfrm>
+              <a:off x="4756769" y="3305899"/>
+              <a:ext cx="595035" cy="425894"/>
+              <a:chOff x="2503939" y="1440636"/>
+              <a:chExt cx="595035" cy="425894"/>
+            </a:xfrm>
+          </p:grpSpPr>
+          <p:sp>
+            <p:nvSpPr>
+              <p:cNvPr id="108" name="Textfeld 107"/>
+              <p:cNvSpPr txBox="1"/>
+              <p:nvPr/>
+            </p:nvSpPr>
+            <p:spPr>
+              <a:xfrm>
+                <a:off x="2503939" y="1620309"/>
+                <a:ext cx="595035" cy="246221"/>
+              </a:xfrm>
+              <a:prstGeom prst="rect">
+                <a:avLst/>
+              </a:prstGeom>
+              <a:noFill/>
+            </p:spPr>
+            <p:txBody>
+              <a:bodyPr wrap="none" rtlCol="0">
+                <a:spAutoFit/>
+              </a:bodyPr>
+              <a:lstStyle/>
+              <a:p>
+                <a:r>
+                  <a:rPr lang="de-DE" sz="1000" dirty="0" smtClean="0"/>
+                  <a:t>Thomas</a:t>
+                </a:r>
+                <a:endParaRPr lang="en-US" sz="1000" dirty="0"/>
+              </a:p>
+            </p:txBody>
+          </p:sp>
+          <p:pic>
+            <p:nvPicPr>
+              <p:cNvPr id="109" name="Picture 3" descr="C:\Users\MoritzTheile\eclipse_SupeYou\com.supeyou.app\src\main\webapp\heroPics\skype_smile.png"/>
+              <p:cNvPicPr>
+                <a:picLocks noChangeAspect="1" noChangeArrowheads="1"/>
+              </p:cNvPicPr>
+              <p:nvPr/>
+            </p:nvPicPr>
+            <p:blipFill>
+              <a:blip r:embed="rId2">
+                <a:extLst>
+                  <a:ext uri="{28A0092B-C50C-407E-A947-70E740481C1C}">
+                    <a14:useLocalDpi xmlns:a14="http://schemas.microsoft.com/office/drawing/2010/main" val="0"/>
+                  </a:ext>
+                </a:extLst>
+              </a:blip>
+              <a:srcRect/>
+              <a:stretch>
+                <a:fillRect/>
+              </a:stretch>
+            </p:blipFill>
+            <p:spPr bwMode="auto">
+              <a:xfrm>
+                <a:off x="2653308" y="1440636"/>
+                <a:ext cx="190500" cy="190500"/>
+              </a:xfrm>
+              <a:prstGeom prst="rect">
+                <a:avLst/>
+              </a:prstGeom>
+              <a:noFill/>
+              <a:extLst>
+                <a:ext uri="{909E8E84-426E-40DD-AFC4-6F175D3DCCD1}">
+                  <a14:hiddenFill xmlns:a14="http://schemas.microsoft.com/office/drawing/2010/main">
+                    <a:solidFill>
+                      <a:srgbClr val="FFFFFF"/>
+                    </a:solidFill>
+                  </a14:hiddenFill>
+                </a:ext>
+              </a:extLst>
+            </p:spPr>
+          </p:pic>
+        </p:grpSp>
+        <p:sp>
+          <p:nvSpPr>
+            <p:cNvPr id="107" name="Textfeld 106"/>
+            <p:cNvSpPr txBox="1"/>
+            <p:nvPr/>
+          </p:nvSpPr>
+          <p:spPr>
+            <a:xfrm>
+              <a:off x="4880201" y="3139040"/>
+              <a:ext cx="325730" cy="160310"/>
+            </a:xfrm>
+            <a:prstGeom prst="rect">
+              <a:avLst/>
+            </a:prstGeom>
+            <a:noFill/>
+          </p:spPr>
+          <p:txBody>
+            <a:bodyPr wrap="none" tIns="18000" bIns="3600" rtlCol="0">
+              <a:spAutoFit/>
+            </a:bodyPr>
+            <a:lstStyle/>
+            <a:p>
+              <a:r>
+                <a:rPr lang="de-DE" sz="900" dirty="0" smtClean="0"/>
+                <a:t>0 €</a:t>
+              </a:r>
+              <a:endParaRPr lang="en-US" sz="900" dirty="0"/>
+            </a:p>
+          </p:txBody>
+        </p:sp>
+      </p:grpSp>
+      <p:sp>
+        <p:nvSpPr>
+          <p:cNvPr id="29" name="Abgerundetes Rechteck 28"/>
+          <p:cNvSpPr/>
+          <p:nvPr/>
+        </p:nvSpPr>
+        <p:spPr>
+          <a:xfrm>
+            <a:off x="5594754" y="1046319"/>
+            <a:ext cx="338336" cy="207533"/>
+          </a:xfrm>
+          <a:prstGeom prst="roundRect">
+            <a:avLst>
+              <a:gd name="adj" fmla="val 50000"/>
+            </a:avLst>
+          </a:prstGeom>
+          <a:solidFill>
+            <a:schemeClr val="bg1">
+              <a:lumMod val="75000"/>
+            </a:schemeClr>
+          </a:solidFill>
+          <a:ln>
+            <a:noFill/>
+          </a:ln>
+        </p:spPr>
+        <p:style>
+          <a:lnRef idx="2">
+            <a:schemeClr val="accent1">
+              <a:shade val="50000"/>
+            </a:schemeClr>
+          </a:lnRef>
+          <a:fillRef idx="1">
+            <a:schemeClr val="accent1"/>
+          </a:fillRef>
+          <a:effectRef idx="0">
+            <a:schemeClr val="accent1"/>
+          </a:effectRef>
+          <a:fontRef idx="minor">
+            <a:schemeClr val="lt1"/>
+          </a:fontRef>
+        </p:style>
+        <p:txBody>
+          <a:bodyPr lIns="0" tIns="0" rIns="0" bIns="0" rtlCol="0" anchor="ctr"/>
+          <a:lstStyle/>
+          <a:p>
+            <a:pPr algn="ctr"/>
+            <a:r>
+              <a:rPr lang="de-DE" sz="1400" b="1" dirty="0" smtClean="0"/>
+              <a:t>+2</a:t>
+            </a:r>
+            <a:endParaRPr lang="en-US" sz="1400" b="1" dirty="0"/>
+          </a:p>
+        </p:txBody>
+      </p:sp>
+      <p:sp>
+        <p:nvSpPr>
+          <p:cNvPr id="113" name="Abgerundetes Rechteck 112"/>
+          <p:cNvSpPr/>
+          <p:nvPr/>
+        </p:nvSpPr>
+        <p:spPr>
+          <a:xfrm>
+            <a:off x="5572203" y="2062776"/>
+            <a:ext cx="338336" cy="207533"/>
+          </a:xfrm>
+          <a:prstGeom prst="roundRect">
+            <a:avLst>
+              <a:gd name="adj" fmla="val 50000"/>
+            </a:avLst>
+          </a:prstGeom>
+          <a:solidFill>
+            <a:schemeClr val="bg1">
+              <a:lumMod val="75000"/>
+            </a:schemeClr>
+          </a:solidFill>
+          <a:ln>
+            <a:noFill/>
+          </a:ln>
+        </p:spPr>
+        <p:style>
+          <a:lnRef idx="2">
+            <a:schemeClr val="accent1">
+              <a:shade val="50000"/>
+            </a:schemeClr>
+          </a:lnRef>
+          <a:fillRef idx="1">
+            <a:schemeClr val="accent1"/>
+          </a:fillRef>
+          <a:effectRef idx="0">
+            <a:schemeClr val="accent1"/>
+          </a:effectRef>
+          <a:fontRef idx="minor">
+            <a:schemeClr val="lt1"/>
+          </a:fontRef>
+        </p:style>
+        <p:txBody>
+          <a:bodyPr lIns="0" tIns="0" rIns="0" bIns="0" rtlCol="0" anchor="ctr"/>
+          <a:lstStyle/>
+          <a:p>
+            <a:pPr algn="ctr"/>
+            <a:r>
+              <a:rPr lang="de-DE" sz="1400" b="1" dirty="0" smtClean="0"/>
+              <a:t>+2</a:t>
+            </a:r>
+            <a:endParaRPr lang="en-US" sz="1400" b="1" dirty="0"/>
+          </a:p>
+        </p:txBody>
+      </p:sp>
+      <p:grpSp>
+        <p:nvGrpSpPr>
+          <p:cNvPr id="120" name="Gruppieren 119"/>
+          <p:cNvGrpSpPr/>
+          <p:nvPr/>
+        </p:nvGrpSpPr>
+        <p:grpSpPr>
+          <a:xfrm>
+            <a:off x="6159520" y="3970658"/>
+            <a:ext cx="644728" cy="592753"/>
+            <a:chOff x="4756769" y="3139040"/>
+            <a:chExt cx="644728" cy="592753"/>
+          </a:xfrm>
+        </p:grpSpPr>
+        <p:grpSp>
+          <p:nvGrpSpPr>
+            <p:cNvPr id="121" name="Gruppieren 120"/>
+            <p:cNvGrpSpPr/>
+            <p:nvPr/>
+          </p:nvGrpSpPr>
+          <p:grpSpPr>
+            <a:xfrm>
+              <a:off x="4756769" y="3305899"/>
+              <a:ext cx="644728" cy="425894"/>
+              <a:chOff x="2503939" y="1440636"/>
+              <a:chExt cx="644728" cy="425894"/>
+            </a:xfrm>
+          </p:grpSpPr>
+          <p:sp>
+            <p:nvSpPr>
+              <p:cNvPr id="123" name="Textfeld 122"/>
+              <p:cNvSpPr txBox="1"/>
+              <p:nvPr/>
+            </p:nvSpPr>
+            <p:spPr>
+              <a:xfrm>
+                <a:off x="2503939" y="1620309"/>
+                <a:ext cx="644728" cy="246221"/>
+              </a:xfrm>
+              <a:prstGeom prst="rect">
+                <a:avLst/>
+              </a:prstGeom>
+              <a:noFill/>
+            </p:spPr>
+            <p:txBody>
+              <a:bodyPr wrap="none" rtlCol="0">
+                <a:spAutoFit/>
+              </a:bodyPr>
+              <a:lstStyle/>
+              <a:p>
+                <a:r>
+                  <a:rPr lang="de-DE" sz="1000" dirty="0" smtClean="0"/>
+                  <a:t>Christian</a:t>
+                </a:r>
+                <a:endParaRPr lang="en-US" sz="1000" dirty="0"/>
+              </a:p>
+            </p:txBody>
+          </p:sp>
+          <p:pic>
+            <p:nvPicPr>
+              <p:cNvPr id="124" name="Picture 3" descr="C:\Users\MoritzTheile\eclipse_SupeYou\com.supeyou.app\src\main\webapp\heroPics\skype_smile.png"/>
+              <p:cNvPicPr>
+                <a:picLocks noChangeAspect="1" noChangeArrowheads="1"/>
+              </p:cNvPicPr>
+              <p:nvPr/>
+            </p:nvPicPr>
+            <p:blipFill>
+              <a:blip r:embed="rId2">
+                <a:extLst>
+                  <a:ext uri="{28A0092B-C50C-407E-A947-70E740481C1C}">
+                    <a14:useLocalDpi xmlns:a14="http://schemas.microsoft.com/office/drawing/2010/main" val="0"/>
+                  </a:ext>
+                </a:extLst>
+              </a:blip>
+              <a:srcRect/>
+              <a:stretch>
+                <a:fillRect/>
+              </a:stretch>
+            </p:blipFill>
+            <p:spPr bwMode="auto">
+              <a:xfrm>
+                <a:off x="2653308" y="1440636"/>
+                <a:ext cx="190500" cy="190500"/>
+              </a:xfrm>
+              <a:prstGeom prst="rect">
+                <a:avLst/>
+              </a:prstGeom>
+              <a:noFill/>
+              <a:extLst>
+                <a:ext uri="{909E8E84-426E-40DD-AFC4-6F175D3DCCD1}">
+                  <a14:hiddenFill xmlns:a14="http://schemas.microsoft.com/office/drawing/2010/main">
+                    <a:solidFill>
+                      <a:srgbClr val="FFFFFF"/>
+                    </a:solidFill>
+                  </a14:hiddenFill>
+                </a:ext>
+              </a:extLst>
+            </p:spPr>
+          </p:pic>
+        </p:grpSp>
+        <p:sp>
+          <p:nvSpPr>
+            <p:cNvPr id="122" name="Textfeld 121"/>
+            <p:cNvSpPr txBox="1"/>
+            <p:nvPr/>
+          </p:nvSpPr>
+          <p:spPr>
+            <a:xfrm>
+              <a:off x="4880201" y="3139040"/>
+              <a:ext cx="325730" cy="160310"/>
+            </a:xfrm>
+            <a:prstGeom prst="rect">
+              <a:avLst/>
+            </a:prstGeom>
+            <a:noFill/>
+          </p:spPr>
+          <p:txBody>
+            <a:bodyPr wrap="none" tIns="18000" bIns="3600" rtlCol="0">
+              <a:spAutoFit/>
+            </a:bodyPr>
+            <a:lstStyle/>
+            <a:p>
+              <a:r>
+                <a:rPr lang="de-DE" sz="900" dirty="0" smtClean="0"/>
+                <a:t>0 €</a:t>
+              </a:r>
+              <a:endParaRPr lang="en-US" sz="900" dirty="0"/>
+            </a:p>
+          </p:txBody>
+        </p:sp>
+      </p:grpSp>
+      <p:grpSp>
+        <p:nvGrpSpPr>
+          <p:cNvPr id="127" name="Gruppieren 126"/>
+          <p:cNvGrpSpPr/>
+          <p:nvPr/>
+        </p:nvGrpSpPr>
+        <p:grpSpPr>
+          <a:xfrm>
+            <a:off x="4800893" y="4021753"/>
+            <a:ext cx="593432" cy="592753"/>
+            <a:chOff x="4756769" y="3139040"/>
+            <a:chExt cx="593432" cy="592753"/>
+          </a:xfrm>
+        </p:grpSpPr>
+        <p:grpSp>
+          <p:nvGrpSpPr>
+            <p:cNvPr id="128" name="Gruppieren 127"/>
+            <p:cNvGrpSpPr/>
+            <p:nvPr/>
+          </p:nvGrpSpPr>
+          <p:grpSpPr>
+            <a:xfrm>
+              <a:off x="4756769" y="3305899"/>
+              <a:ext cx="593432" cy="425894"/>
+              <a:chOff x="2503939" y="1440636"/>
+              <a:chExt cx="593432" cy="425894"/>
+            </a:xfrm>
+          </p:grpSpPr>
+          <p:sp>
+            <p:nvSpPr>
+              <p:cNvPr id="139" name="Textfeld 138"/>
+              <p:cNvSpPr txBox="1"/>
+              <p:nvPr/>
+            </p:nvSpPr>
+            <p:spPr>
+              <a:xfrm>
+                <a:off x="2503939" y="1620309"/>
+                <a:ext cx="593432" cy="246221"/>
+              </a:xfrm>
+              <a:prstGeom prst="rect">
+                <a:avLst/>
+              </a:prstGeom>
+              <a:noFill/>
+            </p:spPr>
+            <p:txBody>
+              <a:bodyPr wrap="none" rtlCol="0">
+                <a:spAutoFit/>
+              </a:bodyPr>
+              <a:lstStyle/>
+              <a:p>
+                <a:r>
+                  <a:rPr lang="de-DE" sz="1000" dirty="0" smtClean="0"/>
+                  <a:t>Herbert</a:t>
+                </a:r>
+                <a:endParaRPr lang="en-US" sz="1000" dirty="0"/>
+              </a:p>
+            </p:txBody>
+          </p:sp>
+          <p:pic>
+            <p:nvPicPr>
+              <p:cNvPr id="143" name="Picture 3" descr="C:\Users\MoritzTheile\eclipse_SupeYou\com.supeyou.app\src\main\webapp\heroPics\skype_smile.png"/>
+              <p:cNvPicPr>
+                <a:picLocks noChangeAspect="1" noChangeArrowheads="1"/>
+              </p:cNvPicPr>
+              <p:nvPr/>
+            </p:nvPicPr>
+            <p:blipFill>
+              <a:blip r:embed="rId2">
+                <a:extLst>
+                  <a:ext uri="{28A0092B-C50C-407E-A947-70E740481C1C}">
+                    <a14:useLocalDpi xmlns:a14="http://schemas.microsoft.com/office/drawing/2010/main" val="0"/>
+                  </a:ext>
+                </a:extLst>
+              </a:blip>
+              <a:srcRect/>
+              <a:stretch>
+                <a:fillRect/>
+              </a:stretch>
+            </p:blipFill>
+            <p:spPr bwMode="auto">
+              <a:xfrm>
+                <a:off x="2653308" y="1440636"/>
+                <a:ext cx="190500" cy="190500"/>
+              </a:xfrm>
+              <a:prstGeom prst="rect">
+                <a:avLst/>
+              </a:prstGeom>
+              <a:noFill/>
+              <a:extLst>
+                <a:ext uri="{909E8E84-426E-40DD-AFC4-6F175D3DCCD1}">
+                  <a14:hiddenFill xmlns:a14="http://schemas.microsoft.com/office/drawing/2010/main">
+                    <a:solidFill>
+                      <a:srgbClr val="FFFFFF"/>
+                    </a:solidFill>
+                  </a14:hiddenFill>
+                </a:ext>
+              </a:extLst>
+            </p:spPr>
+          </p:pic>
+        </p:grpSp>
+        <p:sp>
+          <p:nvSpPr>
+            <p:cNvPr id="138" name="Textfeld 137"/>
+            <p:cNvSpPr txBox="1"/>
+            <p:nvPr/>
+          </p:nvSpPr>
+          <p:spPr>
+            <a:xfrm>
+              <a:off x="4880201" y="3139040"/>
+              <a:ext cx="325730" cy="160310"/>
+            </a:xfrm>
+            <a:prstGeom prst="rect">
+              <a:avLst/>
+            </a:prstGeom>
+            <a:noFill/>
+          </p:spPr>
+          <p:txBody>
+            <a:bodyPr wrap="none" tIns="18000" bIns="3600" rtlCol="0">
+              <a:spAutoFit/>
+            </a:bodyPr>
+            <a:lstStyle/>
+            <a:p>
+              <a:r>
+                <a:rPr lang="de-DE" sz="900" dirty="0" smtClean="0"/>
+                <a:t>0 €</a:t>
+              </a:r>
+              <a:endParaRPr lang="en-US" sz="900" dirty="0"/>
+            </a:p>
+          </p:txBody>
+        </p:sp>
+      </p:grpSp>
+      <p:cxnSp>
+        <p:nvCxnSpPr>
+          <p:cNvPr id="144" name="Gekrümmte Verbindung 143"/>
+          <p:cNvCxnSpPr>
+            <a:stCxn id="153" idx="2"/>
+            <a:endCxn id="122" idx="0"/>
+          </p:cNvCxnSpPr>
+          <p:nvPr/>
+        </p:nvCxnSpPr>
+        <p:spPr>
+          <a:xfrm rot="16200000" flipH="1">
+            <a:off x="5743897" y="3268737"/>
+            <a:ext cx="661445" cy="742395"/>
+          </a:xfrm>
+          <a:prstGeom prst="curvedConnector3">
+            <a:avLst>
+              <a:gd name="adj1" fmla="val 50000"/>
+            </a:avLst>
+          </a:prstGeom>
+        </p:spPr>
+        <p:style>
+          <a:lnRef idx="1">
+            <a:schemeClr val="accent1"/>
+          </a:lnRef>
+          <a:fillRef idx="0">
+            <a:schemeClr val="accent1"/>
+          </a:fillRef>
+          <a:effectRef idx="0">
+            <a:schemeClr val="accent1"/>
+          </a:effectRef>
+          <a:fontRef idx="minor">
+            <a:schemeClr val="tx1"/>
+          </a:fontRef>
+        </p:style>
+      </p:cxnSp>
+      <p:cxnSp>
+        <p:nvCxnSpPr>
+          <p:cNvPr id="145" name="Gekrümmte Verbindung 144"/>
+          <p:cNvCxnSpPr>
+            <a:stCxn id="153" idx="2"/>
+            <a:endCxn id="138" idx="0"/>
+          </p:cNvCxnSpPr>
+          <p:nvPr/>
+        </p:nvCxnSpPr>
+        <p:spPr>
+          <a:xfrm rot="5400000">
+            <a:off x="5039036" y="3357367"/>
+            <a:ext cx="712540" cy="616232"/>
+          </a:xfrm>
+          <a:prstGeom prst="curvedConnector3">
+            <a:avLst>
+              <a:gd name="adj1" fmla="val 50000"/>
+            </a:avLst>
+          </a:prstGeom>
+        </p:spPr>
+        <p:style>
+          <a:lnRef idx="1">
+            <a:schemeClr val="accent1"/>
+          </a:lnRef>
+          <a:fillRef idx="0">
+            <a:schemeClr val="accent1"/>
+          </a:fillRef>
+          <a:effectRef idx="0">
+            <a:schemeClr val="accent1"/>
+          </a:effectRef>
+          <a:fontRef idx="minor">
+            <a:schemeClr val="tx1"/>
+          </a:fontRef>
+        </p:style>
+      </p:cxnSp>
+      <p:sp>
+        <p:nvSpPr>
+          <p:cNvPr id="146" name="Abgerundetes Rechteck 145"/>
+          <p:cNvSpPr/>
+          <p:nvPr/>
+        </p:nvSpPr>
+        <p:spPr>
+          <a:xfrm>
+            <a:off x="4876344" y="4614506"/>
+            <a:ext cx="338336" cy="207533"/>
+          </a:xfrm>
+          <a:prstGeom prst="roundRect">
+            <a:avLst>
+              <a:gd name="adj" fmla="val 50000"/>
+            </a:avLst>
+          </a:prstGeom>
+          <a:solidFill>
+            <a:schemeClr val="bg1">
+              <a:lumMod val="75000"/>
+            </a:schemeClr>
+          </a:solidFill>
+          <a:ln>
+            <a:noFill/>
+          </a:ln>
+        </p:spPr>
+        <p:style>
+          <a:lnRef idx="2">
+            <a:schemeClr val="accent1">
+              <a:shade val="50000"/>
+            </a:schemeClr>
+          </a:lnRef>
+          <a:fillRef idx="1">
+            <a:schemeClr val="accent1"/>
+          </a:fillRef>
+          <a:effectRef idx="0">
+            <a:schemeClr val="accent1"/>
+          </a:effectRef>
+          <a:fontRef idx="minor">
+            <a:schemeClr val="lt1"/>
+          </a:fontRef>
+        </p:style>
+        <p:txBody>
+          <a:bodyPr lIns="0" tIns="0" rIns="0" bIns="0" rtlCol="0" anchor="ctr"/>
+          <a:lstStyle/>
+          <a:p>
+            <a:pPr algn="ctr"/>
+            <a:r>
+              <a:rPr lang="de-DE" sz="1400" b="1" dirty="0" smtClean="0"/>
+              <a:t>+2</a:t>
+            </a:r>
+            <a:endParaRPr lang="en-US" sz="1400" b="1" dirty="0"/>
+          </a:p>
+        </p:txBody>
+      </p:sp>
+      <p:sp>
+        <p:nvSpPr>
+          <p:cNvPr id="148" name="Abgerundetes Rechteck 147"/>
+          <p:cNvSpPr/>
+          <p:nvPr/>
+        </p:nvSpPr>
+        <p:spPr>
+          <a:xfrm>
+            <a:off x="5527904" y="4590653"/>
+            <a:ext cx="338336" cy="207533"/>
+          </a:xfrm>
+          <a:prstGeom prst="roundRect">
+            <a:avLst>
+              <a:gd name="adj" fmla="val 50000"/>
+            </a:avLst>
+          </a:prstGeom>
+          <a:solidFill>
+            <a:schemeClr val="bg1">
+              <a:lumMod val="75000"/>
+            </a:schemeClr>
+          </a:solidFill>
+          <a:ln>
+            <a:noFill/>
+          </a:ln>
+        </p:spPr>
+        <p:style>
+          <a:lnRef idx="2">
+            <a:schemeClr val="accent1">
+              <a:shade val="50000"/>
+            </a:schemeClr>
+          </a:lnRef>
+          <a:fillRef idx="1">
+            <a:schemeClr val="accent1"/>
+          </a:fillRef>
+          <a:effectRef idx="0">
+            <a:schemeClr val="accent1"/>
+          </a:effectRef>
+          <a:fontRef idx="minor">
+            <a:schemeClr val="lt1"/>
+          </a:fontRef>
+        </p:style>
+        <p:txBody>
+          <a:bodyPr lIns="0" tIns="0" rIns="0" bIns="0" rtlCol="0" anchor="ctr"/>
+          <a:lstStyle/>
+          <a:p>
+            <a:pPr algn="ctr"/>
+            <a:r>
+              <a:rPr lang="de-DE" sz="1400" b="1" dirty="0" smtClean="0"/>
+              <a:t>+7</a:t>
+            </a:r>
+            <a:endParaRPr lang="en-US" sz="1400" b="1" dirty="0"/>
+          </a:p>
+        </p:txBody>
+      </p:sp>
+      <p:sp>
+        <p:nvSpPr>
+          <p:cNvPr id="71" name="Textfeld 70"/>
+          <p:cNvSpPr txBox="1"/>
+          <p:nvPr/>
+        </p:nvSpPr>
+        <p:spPr>
+          <a:xfrm>
+            <a:off x="539552" y="715675"/>
+            <a:ext cx="1320041" cy="369332"/>
+          </a:xfrm>
+          <a:prstGeom prst="rect">
+            <a:avLst/>
+          </a:prstGeom>
+          <a:noFill/>
+        </p:spPr>
+        <p:txBody>
+          <a:bodyPr wrap="none" rtlCol="0">
+            <a:spAutoFit/>
+          </a:bodyPr>
+          <a:lstStyle/>
+          <a:p>
+            <a:r>
+              <a:rPr lang="de-DE" dirty="0" err="1" smtClean="0"/>
+              <a:t>Collapsable</a:t>
+            </a:r>
+            <a:r>
+              <a:rPr lang="de-DE" dirty="0" smtClean="0"/>
+              <a:t>:</a:t>
+            </a:r>
+            <a:endParaRPr lang="en-US" dirty="0"/>
+          </a:p>
+        </p:txBody>
+      </p:sp>
+      <p:sp>
+        <p:nvSpPr>
+          <p:cNvPr id="153" name="Abgerundetes Rechteck 152"/>
+          <p:cNvSpPr/>
+          <p:nvPr/>
+        </p:nvSpPr>
+        <p:spPr>
+          <a:xfrm>
+            <a:off x="5534254" y="3101680"/>
+            <a:ext cx="338336" cy="207533"/>
+          </a:xfrm>
+          <a:prstGeom prst="roundRect">
+            <a:avLst>
+              <a:gd name="adj" fmla="val 50000"/>
+            </a:avLst>
+          </a:prstGeom>
+          <a:solidFill>
+            <a:schemeClr val="bg1">
+              <a:lumMod val="75000"/>
+            </a:schemeClr>
+          </a:solidFill>
+          <a:ln>
+            <a:noFill/>
+          </a:ln>
+        </p:spPr>
+        <p:style>
+          <a:lnRef idx="2">
+            <a:schemeClr val="accent1">
+              <a:shade val="50000"/>
+            </a:schemeClr>
+          </a:lnRef>
+          <a:fillRef idx="1">
+            <a:schemeClr val="accent1"/>
+          </a:fillRef>
+          <a:effectRef idx="0">
+            <a:schemeClr val="accent1"/>
+          </a:effectRef>
+          <a:fontRef idx="minor">
+            <a:schemeClr val="lt1"/>
+          </a:fontRef>
+        </p:style>
+        <p:txBody>
+          <a:bodyPr lIns="0" tIns="0" rIns="0" bIns="0" rtlCol="0" anchor="ctr"/>
+          <a:lstStyle/>
+          <a:p>
+            <a:pPr algn="ctr"/>
+            <a:r>
+              <a:rPr lang="de-DE" sz="1400" b="1" dirty="0" smtClean="0"/>
+              <a:t>-</a:t>
+            </a:r>
+            <a:endParaRPr lang="en-US" sz="1400" b="1" dirty="0"/>
+          </a:p>
+        </p:txBody>
+      </p:sp>
+      <p:sp>
+        <p:nvSpPr>
+          <p:cNvPr id="154" name="Abgerundetes Rechteck 153"/>
+          <p:cNvSpPr/>
+          <p:nvPr/>
+        </p:nvSpPr>
+        <p:spPr>
+          <a:xfrm>
+            <a:off x="6906319" y="4084024"/>
+            <a:ext cx="338336" cy="382040"/>
+          </a:xfrm>
+          <a:prstGeom prst="roundRect">
+            <a:avLst>
+              <a:gd name="adj" fmla="val 50000"/>
+            </a:avLst>
+          </a:prstGeom>
+          <a:solidFill>
+            <a:schemeClr val="tx2">
+              <a:lumMod val="40000"/>
+              <a:lumOff val="60000"/>
+            </a:schemeClr>
+          </a:solidFill>
+          <a:ln>
+            <a:noFill/>
+          </a:ln>
+        </p:spPr>
+        <p:style>
+          <a:lnRef idx="2">
+            <a:schemeClr val="accent1">
+              <a:shade val="50000"/>
+            </a:schemeClr>
+          </a:lnRef>
+          <a:fillRef idx="1">
+            <a:schemeClr val="accent1"/>
+          </a:fillRef>
+          <a:effectRef idx="0">
+            <a:schemeClr val="accent1"/>
+          </a:effectRef>
+          <a:fontRef idx="minor">
+            <a:schemeClr val="lt1"/>
+          </a:fontRef>
+        </p:style>
+        <p:txBody>
+          <a:bodyPr lIns="0" tIns="0" rIns="0" bIns="0" rtlCol="0" anchor="ctr"/>
+          <a:lstStyle/>
+          <a:p>
+            <a:pPr algn="ctr"/>
+            <a:r>
+              <a:rPr lang="de-DE" sz="2800" b="1" dirty="0" smtClean="0"/>
+              <a:t>+</a:t>
+            </a:r>
+            <a:endParaRPr lang="en-US" sz="2800" b="1" dirty="0"/>
+          </a:p>
+        </p:txBody>
+      </p:sp>
+      <p:pic>
+        <p:nvPicPr>
+          <p:cNvPr id="1026" name="Picture 2" descr="Bildergebnis für bilder hero"/>
+          <p:cNvPicPr>
+            <a:picLocks noChangeAspect="1" noChangeArrowheads="1"/>
+          </p:cNvPicPr>
+          <p:nvPr/>
+        </p:nvPicPr>
+        <p:blipFill>
+          <a:blip r:embed="rId3" cstate="print">
+            <a:extLst>
+              <a:ext uri="{28A0092B-C50C-407E-A947-70E740481C1C}">
+                <a14:useLocalDpi xmlns:a14="http://schemas.microsoft.com/office/drawing/2010/main" val="0"/>
+              </a:ext>
+            </a:extLst>
+          </a:blip>
+          <a:srcRect/>
+          <a:stretch>
+            <a:fillRect/>
+          </a:stretch>
+        </p:blipFill>
+        <p:spPr bwMode="auto">
+          <a:xfrm>
+            <a:off x="5384131" y="453566"/>
+            <a:ext cx="628029" cy="417926"/>
+          </a:xfrm>
+          <a:prstGeom prst="rect">
+            <a:avLst/>
+          </a:prstGeom>
+          <a:noFill/>
+          <a:extLst>
+            <a:ext uri="{909E8E84-426E-40DD-AFC4-6F175D3DCCD1}">
+              <a14:hiddenFill xmlns:a14="http://schemas.microsoft.com/office/drawing/2010/main">
+                <a:solidFill>
+                  <a:srgbClr val="FFFFFF"/>
+                </a:solidFill>
+              </a14:hiddenFill>
+            </a:ext>
+          </a:extLst>
+        </p:spPr>
+      </p:pic>
+      <p:pic>
+        <p:nvPicPr>
+          <p:cNvPr id="1028" name="Picture 4" descr="http://supeyou.com/com.supeyou.app.GWT/core/images/emoticon.smile.large.anim.gif"/>
+          <p:cNvPicPr>
+            <a:picLocks noChangeAspect="1" noChangeArrowheads="1" noCrop="1"/>
+          </p:cNvPicPr>
+          <p:nvPr/>
+        </p:nvPicPr>
+        <p:blipFill>
+          <a:blip r:embed="rId4">
+            <a:extLst>
+              <a:ext uri="{28A0092B-C50C-407E-A947-70E740481C1C}">
+                <a14:useLocalDpi xmlns:a14="http://schemas.microsoft.com/office/drawing/2010/main" val="0"/>
+              </a:ext>
+            </a:extLst>
+          </a:blip>
+          <a:srcRect/>
+          <a:stretch>
+            <a:fillRect/>
+          </a:stretch>
+        </p:blipFill>
+        <p:spPr bwMode="auto">
+          <a:xfrm>
+            <a:off x="2267744" y="1956855"/>
+            <a:ext cx="762000" cy="762000"/>
+          </a:xfrm>
+          <a:prstGeom prst="rect">
+            <a:avLst/>
+          </a:prstGeom>
+          <a:noFill/>
+          <a:extLst>
+            <a:ext uri="{909E8E84-426E-40DD-AFC4-6F175D3DCCD1}">
+              <a14:hiddenFill xmlns:a14="http://schemas.microsoft.com/office/drawing/2010/main">
+                <a:solidFill>
+                  <a:srgbClr val="FFFFFF"/>
+                </a:solidFill>
+              </a14:hiddenFill>
+            </a:ext>
+          </a:extLst>
+        </p:spPr>
+      </p:pic>
+    </p:spTree>
+    <p:extLst>
+      <p:ext uri="{BB962C8B-B14F-4D97-AF65-F5344CB8AC3E}">
+        <p14:creationId xmlns:p14="http://schemas.microsoft.com/office/powerpoint/2010/main" val="3042245544"/>
+      </p:ext>
+    </p:extLst>
+  </p:cSld>
+  <p:clrMapOvr>
+    <a:masterClrMapping/>
+  </p:clrMapOvr>
+</p:sld>
+</file>
+
+<file path=ppt/slides/slide6.xml><?xml version="1.0" encoding="utf-8"?>
+<p:sld xmlns:a="http://schemas.openxmlformats.org/drawingml/2006/main" xmlns:r="http://schemas.openxmlformats.org/officeDocument/2006/relationships" xmlns:p="http://schemas.openxmlformats.org/presentationml/2006/main">
+  <p:cSld>
+    <p:spTree>
+      <p:nvGrpSpPr>
+        <p:cNvPr id="1" name=""/>
+        <p:cNvGrpSpPr/>
+        <p:nvPr/>
+      </p:nvGrpSpPr>
+      <p:grpSpPr>
+        <a:xfrm>
+          <a:off x="0" y="0"/>
+          <a:ext cx="0" cy="0"/>
+          <a:chOff x="0" y="0"/>
+          <a:chExt cx="0" cy="0"/>
+        </a:xfrm>
+      </p:grpSpPr>
       <p:sp>
         <p:nvSpPr>
           <p:cNvPr id="2" name="Rechteck 1"/>

</xml_diff>